<commit_message>
engines compare - equivalent classes and print stderr in case of an error
</commit_message>
<xml_diff>
--- a/ppt/First Phase Completion.pptx
+++ b/ppt/First Phase Completion.pptx
@@ -1,17 +1,17 @@
 
 <file path=ppt/presentation.xml><?xml version="1.0" encoding="utf-8"?>
-<p:presentation xmlns:a="http://schemas.openxmlformats.org/drawingml/2006/main" xmlns:r="http://schemas.openxmlformats.org/officeDocument/2006/relationships" xmlns:p="http://schemas.openxmlformats.org/presentationml/2006/main" autoCompressPictures="0">
+<p:presentation xmlns:a="http://schemas.openxmlformats.org/drawingml/2006/main" xmlns:r="http://schemas.openxmlformats.org/officeDocument/2006/relationships" xmlns:p="http://schemas.openxmlformats.org/presentationml/2006/main" rtl="1" autoCompressPictures="0">
   <p:sldMasterIdLst>
     <p:sldMasterId id="2147483648" r:id="rId1"/>
   </p:sldMasterIdLst>
   <p:sldIdLst>
     <p:sldId id="256" r:id="rId2"/>
-    <p:sldId id="259" r:id="rId3"/>
-    <p:sldId id="265" r:id="rId4"/>
-    <p:sldId id="266" r:id="rId5"/>
+    <p:sldId id="268" r:id="rId3"/>
+    <p:sldId id="259" r:id="rId4"/>
+    <p:sldId id="265" r:id="rId5"/>
     <p:sldId id="267" r:id="rId6"/>
-    <p:sldId id="268" r:id="rId7"/>
-    <p:sldId id="269" r:id="rId8"/>
+    <p:sldId id="269" r:id="rId7"/>
+    <p:sldId id="270" r:id="rId8"/>
   </p:sldIdLst>
   <p:sldSz cx="12192000" cy="6858000"/>
   <p:notesSz cx="6858000" cy="9144000"/>
@@ -304,7 +304,7 @@
           <a:p>
             <a:fld id="{4AAD347D-5ACD-4C99-B74B-A9C85AD731AF}" type="datetimeFigureOut">
               <a:rPr lang="en-US" dirty="0"/>
-              <a:t>6/28/2015</a:t>
+              <a:t>6/29/2015</a:t>
             </a:fld>
             <a:endParaRPr lang="en-US" dirty="0"/>
           </a:p>
@@ -574,7 +574,7 @@
           <a:p>
             <a:fld id="{4509A250-FF31-4206-8172-F9D3106AACB1}" type="datetimeFigureOut">
               <a:rPr lang="en-US" dirty="0"/>
-              <a:t>6/28/2015</a:t>
+              <a:t>6/29/2015</a:t>
             </a:fld>
             <a:endParaRPr lang="en-US" dirty="0"/>
           </a:p>
@@ -763,7 +763,7 @@
           <a:p>
             <a:fld id="{4509A250-FF31-4206-8172-F9D3106AACB1}" type="datetimeFigureOut">
               <a:rPr lang="en-US" dirty="0"/>
-              <a:t>6/28/2015</a:t>
+              <a:t>6/29/2015</a:t>
             </a:fld>
             <a:endParaRPr lang="en-US" dirty="0"/>
           </a:p>
@@ -1031,7 +1031,7 @@
           <a:p>
             <a:fld id="{4509A250-FF31-4206-8172-F9D3106AACB1}" type="datetimeFigureOut">
               <a:rPr lang="en-US" dirty="0"/>
-              <a:t>6/28/2015</a:t>
+              <a:t>6/29/2015</a:t>
             </a:fld>
             <a:endParaRPr lang="en-US" dirty="0"/>
           </a:p>
@@ -1367,7 +1367,7 @@
           <a:p>
             <a:fld id="{4509A250-FF31-4206-8172-F9D3106AACB1}" type="datetimeFigureOut">
               <a:rPr lang="en-US" dirty="0"/>
-              <a:t>6/28/2015</a:t>
+              <a:t>6/29/2015</a:t>
             </a:fld>
             <a:endParaRPr lang="en-US" dirty="0"/>
           </a:p>
@@ -1985,7 +1985,7 @@
           <a:p>
             <a:fld id="{4509A250-FF31-4206-8172-F9D3106AACB1}" type="datetimeFigureOut">
               <a:rPr lang="en-US" dirty="0"/>
-              <a:t>6/28/2015</a:t>
+              <a:t>6/29/2015</a:t>
             </a:fld>
             <a:endParaRPr lang="en-US" dirty="0"/>
           </a:p>
@@ -2840,7 +2840,7 @@
           <a:p>
             <a:fld id="{4509A250-FF31-4206-8172-F9D3106AACB1}" type="datetimeFigureOut">
               <a:rPr lang="en-US" dirty="0"/>
-              <a:t>6/28/2015</a:t>
+              <a:t>6/29/2015</a:t>
             </a:fld>
             <a:endParaRPr lang="en-US" dirty="0"/>
           </a:p>
@@ -3005,7 +3005,7 @@
           <a:p>
             <a:fld id="{4509A250-FF31-4206-8172-F9D3106AACB1}" type="datetimeFigureOut">
               <a:rPr lang="en-US" dirty="0"/>
-              <a:t>6/28/2015</a:t>
+              <a:t>6/29/2015</a:t>
             </a:fld>
             <a:endParaRPr lang="en-US" dirty="0"/>
           </a:p>
@@ -3180,7 +3180,7 @@
           <a:p>
             <a:fld id="{4509A250-FF31-4206-8172-F9D3106AACB1}" type="datetimeFigureOut">
               <a:rPr lang="en-US" dirty="0"/>
-              <a:t>6/28/2015</a:t>
+              <a:t>6/29/2015</a:t>
             </a:fld>
             <a:endParaRPr lang="en-US" dirty="0"/>
           </a:p>
@@ -3345,7 +3345,7 @@
           <a:p>
             <a:fld id="{4509A250-FF31-4206-8172-F9D3106AACB1}" type="datetimeFigureOut">
               <a:rPr lang="en-US" dirty="0"/>
-              <a:t>6/28/2015</a:t>
+              <a:t>6/29/2015</a:t>
             </a:fld>
             <a:endParaRPr lang="en-US" dirty="0"/>
           </a:p>
@@ -3587,7 +3587,7 @@
           <a:p>
             <a:fld id="{9796027F-7875-4030-9381-8BD8C4F21935}" type="datetimeFigureOut">
               <a:rPr lang="en-US" dirty="0"/>
-              <a:t>6/28/2015</a:t>
+              <a:t>6/29/2015</a:t>
             </a:fld>
             <a:endParaRPr lang="en-US" dirty="0"/>
           </a:p>
@@ -3874,7 +3874,7 @@
           <a:p>
             <a:fld id="{9796027F-7875-4030-9381-8BD8C4F21935}" type="datetimeFigureOut">
               <a:rPr lang="en-US" dirty="0"/>
-              <a:t>6/28/2015</a:t>
+              <a:t>6/29/2015</a:t>
             </a:fld>
             <a:endParaRPr lang="en-US" dirty="0"/>
           </a:p>
@@ -4313,7 +4313,7 @@
           <a:p>
             <a:fld id="{9796027F-7875-4030-9381-8BD8C4F21935}" type="datetimeFigureOut">
               <a:rPr lang="en-US" dirty="0"/>
-              <a:t>6/28/2015</a:t>
+              <a:t>6/29/2015</a:t>
             </a:fld>
             <a:endParaRPr lang="en-US" dirty="0"/>
           </a:p>
@@ -4426,7 +4426,7 @@
           <a:p>
             <a:fld id="{4509A250-FF31-4206-8172-F9D3106AACB1}" type="datetimeFigureOut">
               <a:rPr lang="en-US" dirty="0"/>
-              <a:t>6/28/2015</a:t>
+              <a:t>6/29/2015</a:t>
             </a:fld>
             <a:endParaRPr lang="en-US" dirty="0"/>
           </a:p>
@@ -4516,7 +4516,7 @@
           <a:p>
             <a:fld id="{4509A250-FF31-4206-8172-F9D3106AACB1}" type="datetimeFigureOut">
               <a:rPr lang="en-US" dirty="0"/>
-              <a:t>6/28/2015</a:t>
+              <a:t>6/29/2015</a:t>
             </a:fld>
             <a:endParaRPr lang="en-US" dirty="0"/>
           </a:p>
@@ -4790,7 +4790,7 @@
           <a:p>
             <a:fld id="{4509A250-FF31-4206-8172-F9D3106AACB1}" type="datetimeFigureOut">
               <a:rPr lang="en-US" dirty="0"/>
-              <a:t>6/28/2015</a:t>
+              <a:t>6/29/2015</a:t>
             </a:fld>
             <a:endParaRPr lang="en-US" dirty="0"/>
           </a:p>
@@ -5060,7 +5060,7 @@
           <a:p>
             <a:fld id="{4509A250-FF31-4206-8172-F9D3106AACB1}" type="datetimeFigureOut">
               <a:rPr lang="en-US" dirty="0"/>
-              <a:t>6/28/2015</a:t>
+              <a:t>6/29/2015</a:t>
             </a:fld>
             <a:endParaRPr lang="en-US" dirty="0"/>
           </a:p>
@@ -5484,7 +5484,7 @@
           <a:p>
             <a:fld id="{4AAD347D-5ACD-4C99-B74B-A9C85AD731AF}" type="datetimeFigureOut">
               <a:rPr lang="en-US" dirty="0"/>
-              <a:t>6/28/2015</a:t>
+              <a:t>6/29/2015</a:t>
             </a:fld>
             <a:endParaRPr lang="en-US" dirty="0"/>
           </a:p>
@@ -6090,7 +6090,7 @@
         </p:nvSpPr>
         <p:spPr>
           <a:xfrm>
-            <a:off x="675861" y="1749286"/>
+            <a:off x="675861" y="1057911"/>
             <a:ext cx="11052313" cy="3495813"/>
           </a:xfrm>
         </p:spPr>
@@ -6100,26 +6100,26 @@
           <a:p>
             <a:pPr algn="ctr"/>
             <a:r>
+              <a:rPr lang="en-US" sz="4800" dirty="0" smtClean="0"/>
+              <a:t>Project Presentation</a:t>
+            </a:r>
+            <a:br>
+              <a:rPr lang="en-US" sz="4800" dirty="0" smtClean="0"/>
+            </a:br>
+            <a:r>
+              <a:rPr lang="en-US" sz="4800" dirty="0" err="1" smtClean="0"/>
+              <a:t>Javascript</a:t>
+            </a:r>
+            <a:r>
               <a:rPr lang="en-US" dirty="0" smtClean="0"/>
-              <a:t>Project Presentation</a:t>
+              <a:t/>
             </a:r>
             <a:br>
               <a:rPr lang="en-US" dirty="0" smtClean="0"/>
             </a:br>
             <a:r>
-              <a:rPr lang="en-US" dirty="0" err="1" smtClean="0"/>
-              <a:t>Javascript</a:t>
-            </a:r>
-            <a:r>
               <a:rPr lang="en-US" dirty="0" smtClean="0"/>
-              <a:t/>
-            </a:r>
-            <a:br>
-              <a:rPr lang="en-US" dirty="0" smtClean="0"/>
-            </a:br>
-            <a:r>
-              <a:rPr lang="en-US" dirty="0" smtClean="0"/>
-              <a:t>First Phase Completion</a:t>
+              <a:t>Phase 1</a:t>
             </a:r>
             <a:endParaRPr lang="he-IL" dirty="0"/>
           </a:p>
@@ -6238,8 +6238,8 @@
         </p:nvSpPr>
         <p:spPr>
           <a:xfrm>
-            <a:off x="830075" y="0"/>
-            <a:ext cx="7772400" cy="1470025"/>
+            <a:off x="830074" y="0"/>
+            <a:ext cx="10275247" cy="1470025"/>
           </a:xfrm>
         </p:spPr>
         <p:txBody>
@@ -6248,7 +6248,7 @@
           <a:p>
             <a:r>
               <a:rPr lang="en-US" dirty="0" smtClean="0"/>
-              <a:t>Goals</a:t>
+              <a:t>Schedule</a:t>
             </a:r>
             <a:endParaRPr lang="he-IL" dirty="0"/>
           </a:p>
@@ -6266,12 +6266,14 @@
         </p:nvSpPr>
         <p:spPr>
           <a:xfrm>
-            <a:off x="997245" y="1762988"/>
-            <a:ext cx="8352928" cy="4968552"/>
+            <a:off x="830074" y="1762988"/>
+            <a:ext cx="8352928" cy="3895690"/>
           </a:xfrm>
         </p:spPr>
         <p:txBody>
-          <a:bodyPr/>
+          <a:bodyPr>
+            <a:normAutofit/>
+          </a:bodyPr>
           <a:lstStyle/>
           <a:p>
             <a:pPr marL="457200" indent="-457200">
@@ -6279,9 +6281,21 @@
               <a:buChar char="§"/>
             </a:pPr>
             <a:r>
-              <a:rPr lang="en-US" sz="2400" dirty="0" smtClean="0"/>
-              <a:t>Finding bugs in different JavaScript Engines</a:t>
-            </a:r>
+              <a:rPr lang="en-US" dirty="0" smtClean="0"/>
+              <a:t>Half-Way through</a:t>
+            </a:r>
+            <a:endParaRPr lang="en-US" dirty="0" smtClean="0"/>
+          </a:p>
+          <a:p>
+            <a:pPr marL="457200" indent="-457200">
+              <a:buFont typeface="Arial" panose="020B0604020202020204" pitchFamily="34" charset="0"/>
+              <a:buChar char="•"/>
+            </a:pPr>
+            <a:r>
+              <a:rPr lang="en-US" dirty="0" smtClean="0"/>
+              <a:t>Milestones</a:t>
+            </a:r>
+            <a:endParaRPr lang="en-US" dirty="0" smtClean="0"/>
           </a:p>
           <a:p>
             <a:pPr marL="914400" lvl="1" indent="-457200" algn="l">
@@ -6289,8 +6303,8 @@
               <a:buChar char="•"/>
             </a:pPr>
             <a:r>
-              <a:rPr lang="en-US" sz="2000" dirty="0" smtClean="0"/>
-              <a:t>Generating randomized complex JS programs</a:t>
+              <a:rPr lang="en-US" dirty="0" smtClean="0"/>
+              <a:t>Progress report – 14.05</a:t>
             </a:r>
           </a:p>
           <a:p>
@@ -6299,741 +6313,16 @@
               <a:buChar char="•"/>
             </a:pPr>
             <a:r>
-              <a:rPr lang="en-US" sz="2000" dirty="0" smtClean="0"/>
-              <a:t>Comparing outputs of different engines</a:t>
-            </a:r>
-          </a:p>
-          <a:p>
-            <a:pPr lvl="1" algn="l"/>
-            <a:endParaRPr lang="en-US" dirty="0" smtClean="0"/>
-          </a:p>
-          <a:p>
-            <a:pPr marL="457200" indent="-457200">
-              <a:buFont typeface="Wingdings" panose="05000000000000000000" pitchFamily="2" charset="2"/>
-              <a:buChar char="§"/>
-            </a:pPr>
-            <a:r>
-              <a:rPr lang="en-US" sz="2400" dirty="0" smtClean="0"/>
-              <a:t>COMPARE </a:t>
-            </a:r>
-            <a:r>
-              <a:rPr lang="en-US" sz="2400" dirty="0"/>
-              <a:t>DIFFERENT </a:t>
-            </a:r>
-            <a:r>
-              <a:rPr lang="en-US" sz="2400" dirty="0" smtClean="0"/>
-              <a:t>ENGINES’ </a:t>
-            </a:r>
-            <a:r>
-              <a:rPr lang="en-US" sz="2400" dirty="0"/>
-              <a:t>BEHAVIOUR </a:t>
-            </a:r>
-            <a:endParaRPr lang="en-US" sz="2400" dirty="0" smtClean="0"/>
-          </a:p>
-          <a:p>
-            <a:pPr marL="914400" lvl="1" indent="-457200" algn="l">
-              <a:buFont typeface="Arial" panose="020B0604020202020204" pitchFamily="34" charset="0"/>
-              <a:buChar char="•"/>
-            </a:pPr>
-            <a:r>
-              <a:rPr lang="en-US" sz="2000" dirty="0" smtClean="0"/>
-              <a:t>No global standard for JS</a:t>
-            </a:r>
-          </a:p>
-          <a:p>
-            <a:pPr lvl="1" algn="l" rtl="0"/>
-            <a:endParaRPr lang="en-US" dirty="0" smtClean="0"/>
-          </a:p>
-          <a:p>
-            <a:pPr marL="914400" lvl="1" indent="-457200" algn="l">
-              <a:buFont typeface="Arial" panose="020B0604020202020204" pitchFamily="34" charset="0"/>
-              <a:buChar char="•"/>
-            </a:pPr>
-            <a:endParaRPr lang="he-IL" dirty="0"/>
-          </a:p>
-        </p:txBody>
-      </p:sp>
-    </p:spTree>
-    <p:extLst>
-      <p:ext uri="{BB962C8B-B14F-4D97-AF65-F5344CB8AC3E}">
-        <p14:creationId xmlns:p14="http://schemas.microsoft.com/office/powerpoint/2010/main" val="4234062775"/>
-      </p:ext>
-    </p:extLst>
-  </p:cSld>
-  <p:clrMapOvr>
-    <a:masterClrMapping/>
-  </p:clrMapOvr>
-  <p:timing>
-    <p:tnLst>
-      <p:par>
-        <p:cTn id="1" dur="indefinite" restart="never" nodeType="tmRoot"/>
-      </p:par>
-    </p:tnLst>
-  </p:timing>
-</p:sld>
-</file>
-
-<file path=ppt/slides/slide3.xml><?xml version="1.0" encoding="utf-8"?>
-<p:sld xmlns:a="http://schemas.openxmlformats.org/drawingml/2006/main" xmlns:r="http://schemas.openxmlformats.org/officeDocument/2006/relationships" xmlns:p="http://schemas.openxmlformats.org/presentationml/2006/main">
-  <p:cSld>
-    <p:spTree>
-      <p:nvGrpSpPr>
-        <p:cNvPr id="1" name=""/>
-        <p:cNvGrpSpPr/>
-        <p:nvPr/>
-      </p:nvGrpSpPr>
-      <p:grpSpPr>
-        <a:xfrm>
-          <a:off x="0" y="0"/>
-          <a:ext cx="0" cy="0"/>
-          <a:chOff x="0" y="0"/>
-          <a:chExt cx="0" cy="0"/>
-        </a:xfrm>
-      </p:grpSpPr>
-      <p:sp>
-        <p:nvSpPr>
-          <p:cNvPr id="2" name="Title 1"/>
-          <p:cNvSpPr>
-            <a:spLocks noGrp="1"/>
-          </p:cNvSpPr>
-          <p:nvPr>
-            <p:ph type="ctrTitle"/>
-          </p:nvPr>
-        </p:nvSpPr>
-        <p:spPr>
-          <a:xfrm>
-            <a:off x="830075" y="0"/>
-            <a:ext cx="7772400" cy="1470025"/>
-          </a:xfrm>
-        </p:spPr>
-        <p:txBody>
-          <a:bodyPr/>
-          <a:lstStyle/>
-          <a:p>
-            <a:r>
-              <a:rPr lang="en-US" dirty="0"/>
-              <a:t>Method</a:t>
-            </a:r>
-            <a:endParaRPr lang="he-IL" dirty="0"/>
-          </a:p>
-        </p:txBody>
-      </p:sp>
-      <p:sp>
-        <p:nvSpPr>
-          <p:cNvPr id="3" name="Subtitle 2"/>
-          <p:cNvSpPr>
-            <a:spLocks noGrp="1"/>
-          </p:cNvSpPr>
-          <p:nvPr>
-            <p:ph type="subTitle" idx="1"/>
-          </p:nvPr>
-        </p:nvSpPr>
-        <p:spPr>
-          <a:xfrm>
-            <a:off x="997245" y="1762988"/>
-            <a:ext cx="8352928" cy="4968552"/>
-          </a:xfrm>
-        </p:spPr>
-        <p:txBody>
-          <a:bodyPr/>
-          <a:lstStyle/>
-          <a:p>
-            <a:pPr marL="457200" indent="-457200">
-              <a:buFont typeface="Wingdings" panose="05000000000000000000" pitchFamily="2" charset="2"/>
-              <a:buChar char="§"/>
-            </a:pPr>
-            <a:r>
               <a:rPr lang="en-US" dirty="0" smtClean="0"/>
-              <a:t>Understanding JavaScript language</a:t>
-            </a:r>
-            <a:endParaRPr lang="en-US" dirty="0"/>
-          </a:p>
-          <a:p>
-            <a:pPr marL="457200" indent="-457200">
-              <a:buFont typeface="Wingdings" panose="05000000000000000000" pitchFamily="2" charset="2"/>
-              <a:buChar char="§"/>
-            </a:pPr>
-            <a:r>
-              <a:rPr lang="en-US" dirty="0"/>
-              <a:t>Generating </a:t>
+              <a:t>First submission - </a:t>
             </a:r>
             <a:r>
               <a:rPr lang="en-US" dirty="0" smtClean="0"/>
-              <a:t>Randomized JS </a:t>
-            </a:r>
-            <a:r>
-              <a:rPr lang="en-US" dirty="0"/>
-              <a:t>code</a:t>
-            </a:r>
-          </a:p>
-          <a:p>
-            <a:pPr marL="457200" indent="-457200">
-              <a:buFont typeface="Wingdings" panose="05000000000000000000" pitchFamily="2" charset="2"/>
-              <a:buChar char="§"/>
-            </a:pPr>
-            <a:r>
-              <a:rPr lang="en-US" dirty="0"/>
-              <a:t>Creating an infrastructure that automatically runs generated code on several </a:t>
+              <a:t>29.06 (10.5 </a:t>
             </a:r>
             <a:r>
               <a:rPr lang="en-US" dirty="0" smtClean="0"/>
-              <a:t>ENGINES and </a:t>
-            </a:r>
-            <a:r>
-              <a:rPr lang="en-US" dirty="0"/>
-              <a:t>compares the </a:t>
-            </a:r>
-            <a:r>
-              <a:rPr lang="en-US" dirty="0" smtClean="0"/>
-              <a:t>output</a:t>
-            </a:r>
-            <a:endParaRPr lang="en-US" dirty="0"/>
-          </a:p>
-          <a:p>
-            <a:pPr marL="457200" indent="-457200">
-              <a:buFont typeface="Wingdings" panose="05000000000000000000" pitchFamily="2" charset="2"/>
-              <a:buChar char="§"/>
-            </a:pPr>
-            <a:r>
-              <a:rPr lang="en-US" dirty="0" smtClean="0"/>
-              <a:t>Enhancing Complexity of the </a:t>
-            </a:r>
-            <a:r>
-              <a:rPr lang="en-US" dirty="0"/>
-              <a:t>generated code </a:t>
-            </a:r>
-            <a:endParaRPr lang="en-US" dirty="0" smtClean="0"/>
-          </a:p>
-          <a:p>
-            <a:pPr marL="914400" lvl="1" indent="-457200" algn="l">
-              <a:buFont typeface="Arial" panose="020B0604020202020204" pitchFamily="34" charset="0"/>
-              <a:buChar char="•"/>
-            </a:pPr>
-            <a:endParaRPr lang="he-IL" dirty="0"/>
-          </a:p>
-        </p:txBody>
-      </p:sp>
-    </p:spTree>
-    <p:extLst>
-      <p:ext uri="{BB962C8B-B14F-4D97-AF65-F5344CB8AC3E}">
-        <p14:creationId xmlns:p14="http://schemas.microsoft.com/office/powerpoint/2010/main" val="1835810275"/>
-      </p:ext>
-    </p:extLst>
-  </p:cSld>
-  <p:clrMapOvr>
-    <a:masterClrMapping/>
-  </p:clrMapOvr>
-  <p:timing>
-    <p:tnLst>
-      <p:par>
-        <p:cTn id="1" dur="indefinite" restart="never" nodeType="tmRoot"/>
-      </p:par>
-    </p:tnLst>
-  </p:timing>
-</p:sld>
-</file>
-
-<file path=ppt/slides/slide4.xml><?xml version="1.0" encoding="utf-8"?>
-<p:sld xmlns:a="http://schemas.openxmlformats.org/drawingml/2006/main" xmlns:r="http://schemas.openxmlformats.org/officeDocument/2006/relationships" xmlns:p="http://schemas.openxmlformats.org/presentationml/2006/main">
-  <p:cSld>
-    <p:spTree>
-      <p:nvGrpSpPr>
-        <p:cNvPr id="1" name=""/>
-        <p:cNvGrpSpPr/>
-        <p:nvPr/>
-      </p:nvGrpSpPr>
-      <p:grpSpPr>
-        <a:xfrm>
-          <a:off x="0" y="0"/>
-          <a:ext cx="0" cy="0"/>
-          <a:chOff x="0" y="0"/>
-          <a:chExt cx="0" cy="0"/>
-        </a:xfrm>
-      </p:grpSpPr>
-      <p:sp>
-        <p:nvSpPr>
-          <p:cNvPr id="2" name="Title 1"/>
-          <p:cNvSpPr>
-            <a:spLocks noGrp="1"/>
-          </p:cNvSpPr>
-          <p:nvPr>
-            <p:ph type="ctrTitle"/>
-          </p:nvPr>
-        </p:nvSpPr>
-        <p:spPr>
-          <a:xfrm>
-            <a:off x="830074" y="0"/>
-            <a:ext cx="10275247" cy="1470025"/>
-          </a:xfrm>
-        </p:spPr>
-        <p:txBody>
-          <a:bodyPr/>
-          <a:lstStyle/>
-          <a:p>
-            <a:r>
-              <a:rPr lang="en-US" dirty="0"/>
-              <a:t>Generating JS code</a:t>
-            </a:r>
-            <a:endParaRPr lang="he-IL" dirty="0"/>
-          </a:p>
-        </p:txBody>
-      </p:sp>
-      <p:sp>
-        <p:nvSpPr>
-          <p:cNvPr id="3" name="Subtitle 2"/>
-          <p:cNvSpPr>
-            <a:spLocks noGrp="1"/>
-          </p:cNvSpPr>
-          <p:nvPr>
-            <p:ph type="subTitle" idx="1"/>
-          </p:nvPr>
-        </p:nvSpPr>
-        <p:spPr>
-          <a:xfrm>
-            <a:off x="997245" y="1762988"/>
-            <a:ext cx="8352928" cy="4968552"/>
-          </a:xfrm>
-        </p:spPr>
-        <p:txBody>
-          <a:bodyPr/>
-          <a:lstStyle/>
-          <a:p>
-            <a:pPr marL="457200" indent="-457200">
-              <a:buFont typeface="Wingdings" panose="05000000000000000000" pitchFamily="2" charset="2"/>
-              <a:buChar char="§"/>
-            </a:pPr>
-            <a:r>
-              <a:rPr lang="en-US" dirty="0"/>
-              <a:t>building AST </a:t>
-            </a:r>
-            <a:r>
-              <a:rPr lang="en-US" dirty="0" smtClean="0"/>
-              <a:t>nodes</a:t>
-            </a:r>
-          </a:p>
-          <a:p>
-            <a:pPr marL="914400" lvl="1" indent="-457200" algn="l">
-              <a:buFont typeface="Arial" panose="020B0604020202020204" pitchFamily="34" charset="0"/>
-              <a:buChar char="•"/>
-            </a:pPr>
-            <a:r>
-              <a:rPr lang="en-US" dirty="0" smtClean="0"/>
-              <a:t>Function, classes</a:t>
-            </a:r>
-          </a:p>
-          <a:p>
-            <a:pPr marL="914400" lvl="1" indent="-457200" algn="l">
-              <a:buFont typeface="Arial" panose="020B0604020202020204" pitchFamily="34" charset="0"/>
-              <a:buChar char="•"/>
-            </a:pPr>
-            <a:r>
-              <a:rPr lang="en-US" dirty="0" smtClean="0"/>
-              <a:t>Variable scoping</a:t>
-            </a:r>
-          </a:p>
-          <a:p>
-            <a:pPr marL="914400" lvl="1" indent="-457200" algn="l">
-              <a:buFont typeface="Arial" panose="020B0604020202020204" pitchFamily="34" charset="0"/>
-              <a:buChar char="•"/>
-            </a:pPr>
-            <a:r>
-              <a:rPr lang="en-US" dirty="0" smtClean="0"/>
-              <a:t>Statements – assignment, binary/</a:t>
-            </a:r>
-            <a:r>
-              <a:rPr lang="en-US" dirty="0" err="1" smtClean="0"/>
-              <a:t>unray</a:t>
-            </a:r>
-            <a:r>
-              <a:rPr lang="en-US" dirty="0" smtClean="0"/>
-              <a:t> operation, functions calls</a:t>
-            </a:r>
-            <a:endParaRPr lang="en-US" dirty="0"/>
-          </a:p>
-          <a:p>
-            <a:pPr marL="457200" indent="-457200">
-              <a:buFont typeface="Wingdings" panose="05000000000000000000" pitchFamily="2" charset="2"/>
-              <a:buChar char="§"/>
-            </a:pPr>
-            <a:r>
-              <a:rPr lang="en-US" dirty="0" smtClean="0"/>
-              <a:t>Automatically generating an AST</a:t>
-            </a:r>
-          </a:p>
-          <a:p>
-            <a:pPr marL="914400" lvl="1" indent="-457200" algn="l">
-              <a:buFont typeface="Arial" panose="020B0604020202020204" pitchFamily="34" charset="0"/>
-              <a:buChar char="•"/>
-            </a:pPr>
-            <a:r>
-              <a:rPr lang="en-US" dirty="0" smtClean="0"/>
-              <a:t>Type </a:t>
-            </a:r>
-            <a:r>
-              <a:rPr lang="en-US" dirty="0"/>
-              <a:t>table</a:t>
-            </a:r>
-          </a:p>
-          <a:p>
-            <a:pPr marL="914400" lvl="1" indent="-457200" algn="l">
-              <a:buFont typeface="Arial" panose="020B0604020202020204" pitchFamily="34" charset="0"/>
-              <a:buChar char="•"/>
-            </a:pPr>
-            <a:r>
-              <a:rPr lang="en-US" dirty="0"/>
-              <a:t>symbol table</a:t>
-            </a:r>
-          </a:p>
-          <a:p>
-            <a:pPr marL="914400" lvl="1" indent="-457200" algn="l">
-              <a:buFont typeface="Arial" panose="020B0604020202020204" pitchFamily="34" charset="0"/>
-              <a:buChar char="•"/>
-            </a:pPr>
-            <a:r>
-              <a:rPr lang="en-US" dirty="0"/>
-              <a:t>Possibly other metadata structures</a:t>
-            </a:r>
-          </a:p>
-          <a:p>
-            <a:pPr marL="457200" indent="-457200">
-              <a:buFont typeface="Wingdings" panose="05000000000000000000" pitchFamily="2" charset="2"/>
-              <a:buChar char="§"/>
-            </a:pPr>
-            <a:r>
-              <a:rPr lang="en-US" dirty="0"/>
-              <a:t>Parsing the AST to JS code</a:t>
-            </a:r>
-          </a:p>
-          <a:p>
-            <a:pPr marL="457200" indent="-457200">
-              <a:buFont typeface="Arial" panose="020B0604020202020204" pitchFamily="34" charset="0"/>
-              <a:buChar char="•"/>
-            </a:pPr>
-            <a:endParaRPr lang="en-US" dirty="0"/>
-          </a:p>
-        </p:txBody>
-      </p:sp>
-    </p:spTree>
-    <p:extLst>
-      <p:ext uri="{BB962C8B-B14F-4D97-AF65-F5344CB8AC3E}">
-        <p14:creationId xmlns:p14="http://schemas.microsoft.com/office/powerpoint/2010/main" val="208651341"/>
-      </p:ext>
-    </p:extLst>
-  </p:cSld>
-  <p:clrMapOvr>
-    <a:masterClrMapping/>
-  </p:clrMapOvr>
-  <p:timing>
-    <p:tnLst>
-      <p:par>
-        <p:cTn id="1" dur="indefinite" restart="never" nodeType="tmRoot"/>
-      </p:par>
-    </p:tnLst>
-  </p:timing>
-</p:sld>
-</file>
-
-<file path=ppt/slides/slide5.xml><?xml version="1.0" encoding="utf-8"?>
-<p:sld xmlns:a="http://schemas.openxmlformats.org/drawingml/2006/main" xmlns:r="http://schemas.openxmlformats.org/officeDocument/2006/relationships" xmlns:p="http://schemas.openxmlformats.org/presentationml/2006/main">
-  <p:cSld>
-    <p:spTree>
-      <p:nvGrpSpPr>
-        <p:cNvPr id="1" name=""/>
-        <p:cNvGrpSpPr/>
-        <p:nvPr/>
-      </p:nvGrpSpPr>
-      <p:grpSpPr>
-        <a:xfrm>
-          <a:off x="0" y="0"/>
-          <a:ext cx="0" cy="0"/>
-          <a:chOff x="0" y="0"/>
-          <a:chExt cx="0" cy="0"/>
-        </a:xfrm>
-      </p:grpSpPr>
-      <p:sp>
-        <p:nvSpPr>
-          <p:cNvPr id="2" name="Title 1"/>
-          <p:cNvSpPr>
-            <a:spLocks noGrp="1"/>
-          </p:cNvSpPr>
-          <p:nvPr>
-            <p:ph type="ctrTitle"/>
-          </p:nvPr>
-        </p:nvSpPr>
-        <p:spPr>
-          <a:xfrm>
-            <a:off x="830074" y="0"/>
-            <a:ext cx="11361926" cy="1470025"/>
-          </a:xfrm>
-        </p:spPr>
-        <p:txBody>
-          <a:bodyPr/>
-          <a:lstStyle/>
-          <a:p>
-            <a:r>
-              <a:rPr lang="en-US" dirty="0" smtClean="0"/>
-              <a:t>Engines infrastructure</a:t>
-            </a:r>
-            <a:endParaRPr lang="he-IL" dirty="0"/>
-          </a:p>
-        </p:txBody>
-      </p:sp>
-      <p:sp>
-        <p:nvSpPr>
-          <p:cNvPr id="3" name="Subtitle 2"/>
-          <p:cNvSpPr>
-            <a:spLocks noGrp="1"/>
-          </p:cNvSpPr>
-          <p:nvPr>
-            <p:ph type="subTitle" idx="1"/>
-          </p:nvPr>
-        </p:nvSpPr>
-        <p:spPr>
-          <a:xfrm>
-            <a:off x="997245" y="1762988"/>
-            <a:ext cx="8352928" cy="4968552"/>
-          </a:xfrm>
-        </p:spPr>
-        <p:txBody>
-          <a:bodyPr/>
-          <a:lstStyle/>
-          <a:p>
-            <a:pPr marL="457200" indent="-457200">
-              <a:buFont typeface="Wingdings" panose="05000000000000000000" pitchFamily="2" charset="2"/>
-              <a:buChar char="§"/>
-            </a:pPr>
-            <a:r>
-              <a:rPr lang="en-US" dirty="0" smtClean="0"/>
-              <a:t>node.js – CHROME </a:t>
-            </a:r>
-            <a:endParaRPr lang="en-US" dirty="0"/>
-          </a:p>
-          <a:p>
-            <a:pPr marL="457200" indent="-457200">
-              <a:buFont typeface="Wingdings" panose="05000000000000000000" pitchFamily="2" charset="2"/>
-              <a:buChar char="§"/>
-            </a:pPr>
-            <a:r>
-              <a:rPr lang="en-US" dirty="0" err="1"/>
-              <a:t>SpiderMonkey</a:t>
-            </a:r>
-            <a:r>
-              <a:rPr lang="en-US" dirty="0"/>
-              <a:t> </a:t>
-            </a:r>
-            <a:r>
-              <a:rPr lang="en-US" dirty="0" smtClean="0"/>
-              <a:t>– Firefox</a:t>
-            </a:r>
-          </a:p>
-          <a:p>
-            <a:pPr marL="457200" indent="-457200">
-              <a:buFont typeface="Wingdings" panose="05000000000000000000" pitchFamily="2" charset="2"/>
-              <a:buChar char="§"/>
-            </a:pPr>
-            <a:r>
-              <a:rPr lang="en-US" dirty="0" smtClean="0"/>
-              <a:t>DYNJS</a:t>
-            </a:r>
-          </a:p>
-          <a:p>
-            <a:pPr marL="457200" indent="-457200">
-              <a:buFont typeface="Wingdings" panose="05000000000000000000" pitchFamily="2" charset="2"/>
-              <a:buChar char="§"/>
-            </a:pPr>
-            <a:r>
-              <a:rPr lang="en-US" dirty="0" smtClean="0"/>
-              <a:t>RHINO</a:t>
-            </a:r>
-          </a:p>
-          <a:p>
-            <a:pPr marL="457200" indent="-457200">
-              <a:buFont typeface="Wingdings" panose="05000000000000000000" pitchFamily="2" charset="2"/>
-              <a:buChar char="§"/>
-            </a:pPr>
-            <a:r>
-              <a:rPr lang="en-US" dirty="0" smtClean="0"/>
-              <a:t>NASHORN </a:t>
-            </a:r>
-          </a:p>
-          <a:p>
-            <a:endParaRPr lang="en-US" dirty="0"/>
-          </a:p>
-          <a:p>
-            <a:pPr marL="457200" indent="-457200">
-              <a:buFont typeface="Arial" panose="020B0604020202020204" pitchFamily="34" charset="0"/>
-              <a:buChar char="•"/>
-            </a:pPr>
-            <a:endParaRPr lang="en-US" dirty="0"/>
-          </a:p>
-        </p:txBody>
-      </p:sp>
-    </p:spTree>
-    <p:extLst>
-      <p:ext uri="{BB962C8B-B14F-4D97-AF65-F5344CB8AC3E}">
-        <p14:creationId xmlns:p14="http://schemas.microsoft.com/office/powerpoint/2010/main" val="735615641"/>
-      </p:ext>
-    </p:extLst>
-  </p:cSld>
-  <p:clrMapOvr>
-    <a:masterClrMapping/>
-  </p:clrMapOvr>
-  <p:timing>
-    <p:tnLst>
-      <p:par>
-        <p:cTn id="1" dur="indefinite" restart="never" nodeType="tmRoot"/>
-      </p:par>
-    </p:tnLst>
-  </p:timing>
-</p:sld>
-</file>
-
-<file path=ppt/slides/slide6.xml><?xml version="1.0" encoding="utf-8"?>
-<p:sld xmlns:a="http://schemas.openxmlformats.org/drawingml/2006/main" xmlns:r="http://schemas.openxmlformats.org/officeDocument/2006/relationships" xmlns:p="http://schemas.openxmlformats.org/presentationml/2006/main">
-  <p:cSld>
-    <p:spTree>
-      <p:nvGrpSpPr>
-        <p:cNvPr id="1" name=""/>
-        <p:cNvGrpSpPr/>
-        <p:nvPr/>
-      </p:nvGrpSpPr>
-      <p:grpSpPr>
-        <a:xfrm>
-          <a:off x="0" y="0"/>
-          <a:ext cx="0" cy="0"/>
-          <a:chOff x="0" y="0"/>
-          <a:chExt cx="0" cy="0"/>
-        </a:xfrm>
-      </p:grpSpPr>
-      <p:sp>
-        <p:nvSpPr>
-          <p:cNvPr id="2" name="Title 1"/>
-          <p:cNvSpPr>
-            <a:spLocks noGrp="1"/>
-          </p:cNvSpPr>
-          <p:nvPr>
-            <p:ph type="ctrTitle"/>
-          </p:nvPr>
-        </p:nvSpPr>
-        <p:spPr>
-          <a:xfrm>
-            <a:off x="830074" y="0"/>
-            <a:ext cx="10275247" cy="1470025"/>
-          </a:xfrm>
-        </p:spPr>
-        <p:txBody>
-          <a:bodyPr/>
-          <a:lstStyle/>
-          <a:p>
-            <a:r>
-              <a:rPr lang="en-US" dirty="0" smtClean="0"/>
-              <a:t>Schedule</a:t>
-            </a:r>
-            <a:endParaRPr lang="he-IL" dirty="0"/>
-          </a:p>
-        </p:txBody>
-      </p:sp>
-      <p:sp>
-        <p:nvSpPr>
-          <p:cNvPr id="3" name="Subtitle 2"/>
-          <p:cNvSpPr>
-            <a:spLocks noGrp="1"/>
-          </p:cNvSpPr>
-          <p:nvPr>
-            <p:ph type="subTitle" idx="1"/>
-          </p:nvPr>
-        </p:nvSpPr>
-        <p:spPr>
-          <a:xfrm>
-            <a:off x="997245" y="1762988"/>
-            <a:ext cx="8352928" cy="3895690"/>
-          </a:xfrm>
-        </p:spPr>
-        <p:txBody>
-          <a:bodyPr>
-            <a:normAutofit lnSpcReduction="10000"/>
-          </a:bodyPr>
-          <a:lstStyle/>
-          <a:p>
-            <a:pPr marL="457200" indent="-457200">
-              <a:buFont typeface="Wingdings" panose="05000000000000000000" pitchFamily="2" charset="2"/>
-              <a:buChar char="§"/>
-            </a:pPr>
-            <a:r>
-              <a:rPr lang="en-US" dirty="0" smtClean="0"/>
-              <a:t>Kick off – today </a:t>
-            </a:r>
-          </a:p>
-          <a:p>
-            <a:pPr marL="457200" indent="-457200">
-              <a:buFont typeface="Wingdings" panose="05000000000000000000" pitchFamily="2" charset="2"/>
-              <a:buChar char="§"/>
-            </a:pPr>
-            <a:r>
-              <a:rPr lang="en-US" dirty="0" smtClean="0"/>
-              <a:t>parallel Work</a:t>
-            </a:r>
-          </a:p>
-          <a:p>
-            <a:pPr marL="914400" lvl="1" indent="-457200" algn="l">
-              <a:buFont typeface="Arial" panose="020B0604020202020204" pitchFamily="34" charset="0"/>
-              <a:buChar char="•"/>
-            </a:pPr>
-            <a:r>
-              <a:rPr lang="en-US" dirty="0" smtClean="0"/>
-              <a:t>JS representation</a:t>
-            </a:r>
-            <a:endParaRPr lang="en-US" dirty="0"/>
-          </a:p>
-          <a:p>
-            <a:pPr marL="914400" lvl="1" indent="-457200" algn="l">
-              <a:buFont typeface="Arial" panose="020B0604020202020204" pitchFamily="34" charset="0"/>
-              <a:buChar char="•"/>
-            </a:pPr>
-            <a:r>
-              <a:rPr lang="en-US" dirty="0" smtClean="0"/>
-              <a:t>Randomization</a:t>
-            </a:r>
-            <a:endParaRPr lang="en-US" dirty="0"/>
-          </a:p>
-          <a:p>
-            <a:pPr marL="914400" lvl="1" indent="-457200" algn="l">
-              <a:buFont typeface="Arial" panose="020B0604020202020204" pitchFamily="34" charset="0"/>
-              <a:buChar char="•"/>
-            </a:pPr>
-            <a:r>
-              <a:rPr lang="en-US" dirty="0" smtClean="0"/>
-              <a:t>Engine infrastructure</a:t>
-            </a:r>
-          </a:p>
-          <a:p>
-            <a:pPr marL="457200" indent="-457200">
-              <a:buFont typeface="Arial" panose="020B0604020202020204" pitchFamily="34" charset="0"/>
-              <a:buChar char="•"/>
-            </a:pPr>
-            <a:r>
-              <a:rPr lang="en-US" dirty="0" smtClean="0"/>
-              <a:t>Milestones</a:t>
-            </a:r>
-          </a:p>
-          <a:p>
-            <a:pPr marL="914400" lvl="1" indent="-457200" algn="l">
-              <a:buFont typeface="Arial" panose="020B0604020202020204" pitchFamily="34" charset="0"/>
-              <a:buChar char="•"/>
-            </a:pPr>
-            <a:r>
-              <a:rPr lang="en-US" dirty="0" smtClean="0"/>
-              <a:t>Progress report – 14.05</a:t>
-            </a:r>
-          </a:p>
-          <a:p>
-            <a:pPr marL="914400" lvl="1" indent="-457200" algn="l">
-              <a:buFont typeface="Arial" panose="020B0604020202020204" pitchFamily="34" charset="0"/>
-              <a:buChar char="•"/>
-            </a:pPr>
-            <a:r>
-              <a:rPr lang="en-US" dirty="0" smtClean="0"/>
-              <a:t>First submission - 18.06 (9 weeks)</a:t>
+              <a:t>weeks)</a:t>
             </a:r>
           </a:p>
           <a:p>
@@ -7075,13 +6364,13 @@
           <p:nvPr>
             <p:extLst>
               <p:ext uri="{D42A27DB-BD31-4B8C-83A1-F6EECF244321}">
-                <p14:modId xmlns:p14="http://schemas.microsoft.com/office/powerpoint/2010/main" val="731557860"/>
+                <p14:modId xmlns:p14="http://schemas.microsoft.com/office/powerpoint/2010/main" val="2829634217"/>
               </p:ext>
             </p:extLst>
           </p:nvPr>
         </p:nvGraphicFramePr>
         <p:xfrm>
-          <a:off x="5681520" y="1762989"/>
+          <a:off x="5815335" y="1549180"/>
           <a:ext cx="6035081" cy="4714786"/>
         </p:xfrm>
         <a:graphic>
@@ -7394,7 +6683,7 @@
                           <a:ea typeface="+mn-ea"/>
                           <a:cs typeface="+mn-cs"/>
                         </a:rPr>
-                        <a:t>6-8</a:t>
+                        <a:t>6-9</a:t>
                       </a:r>
                       <a:endParaRPr lang="he-IL" sz="1800" kern="1200" dirty="0">
                         <a:solidFill>
@@ -7476,7 +6765,7 @@
                           <a:ea typeface="+mn-ea"/>
                           <a:cs typeface="+mn-cs"/>
                         </a:rPr>
-                        <a:t>9</a:t>
+                        <a:t>10-11</a:t>
                       </a:r>
                       <a:endParaRPr lang="he-IL" sz="1800" kern="1200" dirty="0">
                         <a:solidFill>
@@ -7505,7 +6794,7 @@
                           <a:ea typeface="+mn-ea"/>
                           <a:cs typeface="+mn-cs"/>
                         </a:rPr>
-                        <a:t>Buffer (until first submission)</a:t>
+                        <a:t>Exam period</a:t>
                       </a:r>
                       <a:endParaRPr lang="he-IL" sz="1800" kern="1200" dirty="0">
                         <a:solidFill>
@@ -7558,7 +6847,7 @@
                           <a:ea typeface="+mn-ea"/>
                           <a:cs typeface="+mn-cs"/>
                         </a:rPr>
-                        <a:t>10-14</a:t>
+                        <a:t>12-15</a:t>
                       </a:r>
                       <a:endParaRPr lang="he-IL" sz="1800" kern="1200" dirty="0">
                         <a:solidFill>
@@ -7738,7 +7027,7 @@
                           <a:ea typeface="+mn-ea"/>
                           <a:cs typeface="+mn-cs"/>
                         </a:rPr>
-                        <a:t>14-16</a:t>
+                        <a:t>15-17</a:t>
                       </a:r>
                       <a:endParaRPr lang="he-IL" sz="1800" kern="1200" dirty="0">
                         <a:solidFill>
@@ -7831,7 +7120,7 @@
                           <a:ea typeface="+mn-ea"/>
                           <a:cs typeface="+mn-cs"/>
                         </a:rPr>
-                        <a:t>16-18</a:t>
+                        <a:t>17-18</a:t>
                       </a:r>
                       <a:endParaRPr lang="he-IL" sz="1800" kern="1200" dirty="0">
                         <a:solidFill>
@@ -7925,6 +7214,1083 @@
 </p:sld>
 </file>
 
+<file path=ppt/slides/slide3.xml><?xml version="1.0" encoding="utf-8"?>
+<p:sld xmlns:a="http://schemas.openxmlformats.org/drawingml/2006/main" xmlns:r="http://schemas.openxmlformats.org/officeDocument/2006/relationships" xmlns:p="http://schemas.openxmlformats.org/presentationml/2006/main">
+  <p:cSld>
+    <p:spTree>
+      <p:nvGrpSpPr>
+        <p:cNvPr id="1" name=""/>
+        <p:cNvGrpSpPr/>
+        <p:nvPr/>
+      </p:nvGrpSpPr>
+      <p:grpSpPr>
+        <a:xfrm>
+          <a:off x="0" y="0"/>
+          <a:ext cx="0" cy="0"/>
+          <a:chOff x="0" y="0"/>
+          <a:chExt cx="0" cy="0"/>
+        </a:xfrm>
+      </p:grpSpPr>
+      <p:sp>
+        <p:nvSpPr>
+          <p:cNvPr id="2" name="Title 1"/>
+          <p:cNvSpPr>
+            <a:spLocks noGrp="1"/>
+          </p:cNvSpPr>
+          <p:nvPr>
+            <p:ph type="ctrTitle"/>
+          </p:nvPr>
+        </p:nvSpPr>
+        <p:spPr>
+          <a:xfrm>
+            <a:off x="830075" y="0"/>
+            <a:ext cx="7772400" cy="1470025"/>
+          </a:xfrm>
+        </p:spPr>
+        <p:txBody>
+          <a:bodyPr/>
+          <a:lstStyle/>
+          <a:p>
+            <a:r>
+              <a:rPr lang="en-US" dirty="0" smtClean="0"/>
+              <a:t>Goals</a:t>
+            </a:r>
+            <a:endParaRPr lang="he-IL" dirty="0"/>
+          </a:p>
+        </p:txBody>
+      </p:sp>
+      <p:sp>
+        <p:nvSpPr>
+          <p:cNvPr id="3" name="Subtitle 2"/>
+          <p:cNvSpPr>
+            <a:spLocks noGrp="1"/>
+          </p:cNvSpPr>
+          <p:nvPr>
+            <p:ph type="subTitle" idx="1"/>
+          </p:nvPr>
+        </p:nvSpPr>
+        <p:spPr>
+          <a:xfrm>
+            <a:off x="997245" y="1762988"/>
+            <a:ext cx="8352928" cy="4968552"/>
+          </a:xfrm>
+        </p:spPr>
+        <p:txBody>
+          <a:bodyPr/>
+          <a:lstStyle/>
+          <a:p>
+            <a:pPr marL="457200" indent="-457200">
+              <a:buFont typeface="Wingdings" panose="05000000000000000000" pitchFamily="2" charset="2"/>
+              <a:buChar char="§"/>
+            </a:pPr>
+            <a:r>
+              <a:rPr lang="en-US" sz="2400" dirty="0" smtClean="0"/>
+              <a:t>Finding bugs in different JavaScript Engines</a:t>
+            </a:r>
+          </a:p>
+          <a:p>
+            <a:pPr marL="914400" lvl="1" indent="-457200" algn="l">
+              <a:buFont typeface="Arial" panose="020B0604020202020204" pitchFamily="34" charset="0"/>
+              <a:buChar char="•"/>
+            </a:pPr>
+            <a:r>
+              <a:rPr lang="en-US" sz="2000" dirty="0" smtClean="0"/>
+              <a:t>Generating randomized complex JS programs</a:t>
+            </a:r>
+          </a:p>
+          <a:p>
+            <a:pPr marL="914400" lvl="1" indent="-457200" algn="l">
+              <a:buFont typeface="Arial" panose="020B0604020202020204" pitchFamily="34" charset="0"/>
+              <a:buChar char="•"/>
+            </a:pPr>
+            <a:r>
+              <a:rPr lang="en-US" sz="2000" dirty="0" smtClean="0"/>
+              <a:t>Comparing outputs of different engines</a:t>
+            </a:r>
+          </a:p>
+          <a:p>
+            <a:pPr lvl="1" algn="l"/>
+            <a:endParaRPr lang="en-US" dirty="0" smtClean="0"/>
+          </a:p>
+          <a:p>
+            <a:pPr marL="457200" indent="-457200">
+              <a:buFont typeface="Wingdings" panose="05000000000000000000" pitchFamily="2" charset="2"/>
+              <a:buChar char="§"/>
+            </a:pPr>
+            <a:r>
+              <a:rPr lang="en-US" sz="2400" dirty="0" smtClean="0"/>
+              <a:t>COMPARE </a:t>
+            </a:r>
+            <a:r>
+              <a:rPr lang="en-US" sz="2400" dirty="0"/>
+              <a:t>DIFFERENT </a:t>
+            </a:r>
+            <a:r>
+              <a:rPr lang="en-US" sz="2400" dirty="0" smtClean="0"/>
+              <a:t>ENGINES’ </a:t>
+            </a:r>
+            <a:r>
+              <a:rPr lang="en-US" sz="2400" dirty="0"/>
+              <a:t>BEHAVIOUR </a:t>
+            </a:r>
+            <a:endParaRPr lang="en-US" sz="2400" dirty="0" smtClean="0"/>
+          </a:p>
+          <a:p>
+            <a:pPr marL="914400" lvl="1" indent="-457200" algn="l">
+              <a:buFont typeface="Arial" panose="020B0604020202020204" pitchFamily="34" charset="0"/>
+              <a:buChar char="•"/>
+            </a:pPr>
+            <a:r>
+              <a:rPr lang="en-US" sz="2000" dirty="0" smtClean="0"/>
+              <a:t>No global standard for JS</a:t>
+            </a:r>
+          </a:p>
+          <a:p>
+            <a:pPr lvl="1" algn="l" rtl="0"/>
+            <a:endParaRPr lang="en-US" dirty="0" smtClean="0"/>
+          </a:p>
+          <a:p>
+            <a:pPr marL="914400" lvl="1" indent="-457200" algn="l">
+              <a:buFont typeface="Arial" panose="020B0604020202020204" pitchFamily="34" charset="0"/>
+              <a:buChar char="•"/>
+            </a:pPr>
+            <a:endParaRPr lang="he-IL" dirty="0"/>
+          </a:p>
+        </p:txBody>
+      </p:sp>
+    </p:spTree>
+    <p:extLst>
+      <p:ext uri="{BB962C8B-B14F-4D97-AF65-F5344CB8AC3E}">
+        <p14:creationId xmlns:p14="http://schemas.microsoft.com/office/powerpoint/2010/main" val="4234062775"/>
+      </p:ext>
+    </p:extLst>
+  </p:cSld>
+  <p:clrMapOvr>
+    <a:masterClrMapping/>
+  </p:clrMapOvr>
+  <p:timing>
+    <p:tnLst>
+      <p:par>
+        <p:cTn id="1" dur="indefinite" restart="never" nodeType="tmRoot"/>
+      </p:par>
+    </p:tnLst>
+  </p:timing>
+</p:sld>
+</file>
+
+<file path=ppt/slides/slide4.xml><?xml version="1.0" encoding="utf-8"?>
+<p:sld xmlns:a="http://schemas.openxmlformats.org/drawingml/2006/main" xmlns:r="http://schemas.openxmlformats.org/officeDocument/2006/relationships" xmlns:p="http://schemas.openxmlformats.org/presentationml/2006/main">
+  <p:cSld>
+    <p:spTree>
+      <p:nvGrpSpPr>
+        <p:cNvPr id="1" name=""/>
+        <p:cNvGrpSpPr/>
+        <p:nvPr/>
+      </p:nvGrpSpPr>
+      <p:grpSpPr>
+        <a:xfrm>
+          <a:off x="0" y="0"/>
+          <a:ext cx="0" cy="0"/>
+          <a:chOff x="0" y="0"/>
+          <a:chExt cx="0" cy="0"/>
+        </a:xfrm>
+      </p:grpSpPr>
+      <p:sp>
+        <p:nvSpPr>
+          <p:cNvPr id="2" name="Title 1"/>
+          <p:cNvSpPr>
+            <a:spLocks noGrp="1"/>
+          </p:cNvSpPr>
+          <p:nvPr>
+            <p:ph type="ctrTitle"/>
+          </p:nvPr>
+        </p:nvSpPr>
+        <p:spPr>
+          <a:xfrm>
+            <a:off x="830075" y="0"/>
+            <a:ext cx="7772400" cy="1470025"/>
+          </a:xfrm>
+        </p:spPr>
+        <p:txBody>
+          <a:bodyPr/>
+          <a:lstStyle/>
+          <a:p>
+            <a:r>
+              <a:rPr lang="en-US" dirty="0"/>
+              <a:t>Method</a:t>
+            </a:r>
+            <a:endParaRPr lang="he-IL" dirty="0"/>
+          </a:p>
+        </p:txBody>
+      </p:sp>
+      <p:sp>
+        <p:nvSpPr>
+          <p:cNvPr id="3" name="Subtitle 2"/>
+          <p:cNvSpPr>
+            <a:spLocks noGrp="1"/>
+          </p:cNvSpPr>
+          <p:nvPr>
+            <p:ph type="subTitle" idx="1"/>
+          </p:nvPr>
+        </p:nvSpPr>
+        <p:spPr>
+          <a:xfrm>
+            <a:off x="997245" y="1762988"/>
+            <a:ext cx="8352928" cy="4968552"/>
+          </a:xfrm>
+        </p:spPr>
+        <p:txBody>
+          <a:bodyPr/>
+          <a:lstStyle/>
+          <a:p>
+            <a:pPr marL="457200" indent="-457200">
+              <a:buFont typeface="Wingdings" panose="05000000000000000000" pitchFamily="2" charset="2"/>
+              <a:buChar char="§"/>
+            </a:pPr>
+            <a:r>
+              <a:rPr lang="en-US" dirty="0" smtClean="0"/>
+              <a:t>Understanding JavaScript language</a:t>
+            </a:r>
+            <a:endParaRPr lang="en-US" dirty="0"/>
+          </a:p>
+          <a:p>
+            <a:pPr marL="457200" indent="-457200">
+              <a:buFont typeface="Wingdings" panose="05000000000000000000" pitchFamily="2" charset="2"/>
+              <a:buChar char="§"/>
+            </a:pPr>
+            <a:r>
+              <a:rPr lang="en-US" dirty="0"/>
+              <a:t>Generating </a:t>
+            </a:r>
+            <a:r>
+              <a:rPr lang="en-US" dirty="0" smtClean="0"/>
+              <a:t>Randomized JS </a:t>
+            </a:r>
+            <a:r>
+              <a:rPr lang="en-US" dirty="0"/>
+              <a:t>code</a:t>
+            </a:r>
+          </a:p>
+          <a:p>
+            <a:pPr marL="457200" indent="-457200">
+              <a:buFont typeface="Wingdings" panose="05000000000000000000" pitchFamily="2" charset="2"/>
+              <a:buChar char="§"/>
+            </a:pPr>
+            <a:r>
+              <a:rPr lang="en-US" dirty="0"/>
+              <a:t>Creating an infrastructure that automatically runs generated code on several </a:t>
+            </a:r>
+            <a:r>
+              <a:rPr lang="en-US" dirty="0" smtClean="0"/>
+              <a:t>ENGINES and </a:t>
+            </a:r>
+            <a:r>
+              <a:rPr lang="en-US" dirty="0"/>
+              <a:t>compares the </a:t>
+            </a:r>
+            <a:r>
+              <a:rPr lang="en-US" dirty="0" smtClean="0"/>
+              <a:t>output</a:t>
+            </a:r>
+            <a:endParaRPr lang="en-US" dirty="0"/>
+          </a:p>
+          <a:p>
+            <a:pPr marL="457200" indent="-457200">
+              <a:buFont typeface="Wingdings" panose="05000000000000000000" pitchFamily="2" charset="2"/>
+              <a:buChar char="§"/>
+            </a:pPr>
+            <a:r>
+              <a:rPr lang="en-US" dirty="0" smtClean="0"/>
+              <a:t>Enhancing Complexity of the </a:t>
+            </a:r>
+            <a:r>
+              <a:rPr lang="en-US" dirty="0"/>
+              <a:t>generated code </a:t>
+            </a:r>
+            <a:endParaRPr lang="en-US" dirty="0" smtClean="0"/>
+          </a:p>
+          <a:p>
+            <a:pPr marL="914400" lvl="1" indent="-457200" algn="l">
+              <a:buFont typeface="Arial" panose="020B0604020202020204" pitchFamily="34" charset="0"/>
+              <a:buChar char="•"/>
+            </a:pPr>
+            <a:endParaRPr lang="he-IL" dirty="0"/>
+          </a:p>
+        </p:txBody>
+      </p:sp>
+    </p:spTree>
+    <p:extLst>
+      <p:ext uri="{BB962C8B-B14F-4D97-AF65-F5344CB8AC3E}">
+        <p14:creationId xmlns:p14="http://schemas.microsoft.com/office/powerpoint/2010/main" val="1835810275"/>
+      </p:ext>
+    </p:extLst>
+  </p:cSld>
+  <p:clrMapOvr>
+    <a:masterClrMapping/>
+  </p:clrMapOvr>
+  <p:timing>
+    <p:tnLst>
+      <p:par>
+        <p:cTn id="1" dur="indefinite" restart="never" nodeType="tmRoot"/>
+      </p:par>
+    </p:tnLst>
+  </p:timing>
+</p:sld>
+</file>
+
+<file path=ppt/slides/slide5.xml><?xml version="1.0" encoding="utf-8"?>
+<p:sld xmlns:a="http://schemas.openxmlformats.org/drawingml/2006/main" xmlns:r="http://schemas.openxmlformats.org/officeDocument/2006/relationships" xmlns:p="http://schemas.openxmlformats.org/presentationml/2006/main">
+  <p:cSld>
+    <p:spTree>
+      <p:nvGrpSpPr>
+        <p:cNvPr id="1" name=""/>
+        <p:cNvGrpSpPr/>
+        <p:nvPr/>
+      </p:nvGrpSpPr>
+      <p:grpSpPr>
+        <a:xfrm>
+          <a:off x="0" y="0"/>
+          <a:ext cx="0" cy="0"/>
+          <a:chOff x="0" y="0"/>
+          <a:chExt cx="0" cy="0"/>
+        </a:xfrm>
+      </p:grpSpPr>
+      <p:sp>
+        <p:nvSpPr>
+          <p:cNvPr id="2" name="Title 1"/>
+          <p:cNvSpPr>
+            <a:spLocks noGrp="1"/>
+          </p:cNvSpPr>
+          <p:nvPr>
+            <p:ph type="ctrTitle"/>
+          </p:nvPr>
+        </p:nvSpPr>
+        <p:spPr>
+          <a:xfrm>
+            <a:off x="830074" y="0"/>
+            <a:ext cx="11361926" cy="1470025"/>
+          </a:xfrm>
+        </p:spPr>
+        <p:txBody>
+          <a:bodyPr/>
+          <a:lstStyle/>
+          <a:p>
+            <a:r>
+              <a:rPr lang="en-US" dirty="0" smtClean="0"/>
+              <a:t>Supported Engines</a:t>
+            </a:r>
+            <a:endParaRPr lang="he-IL" dirty="0"/>
+          </a:p>
+        </p:txBody>
+      </p:sp>
+      <p:graphicFrame>
+        <p:nvGraphicFramePr>
+          <p:cNvPr id="4" name="טבלה 3"/>
+          <p:cNvGraphicFramePr>
+            <a:graphicFrameLocks noGrp="1"/>
+          </p:cNvGraphicFramePr>
+          <p:nvPr>
+            <p:extLst>
+              <p:ext uri="{D42A27DB-BD31-4B8C-83A1-F6EECF244321}">
+                <p14:modId xmlns:p14="http://schemas.microsoft.com/office/powerpoint/2010/main" val="3368406272"/>
+              </p:ext>
+            </p:extLst>
+          </p:nvPr>
+        </p:nvGraphicFramePr>
+        <p:xfrm>
+          <a:off x="1427356" y="2531330"/>
+          <a:ext cx="9903522" cy="2941315"/>
+        </p:xfrm>
+        <a:graphic>
+          <a:graphicData uri="http://schemas.openxmlformats.org/drawingml/2006/table">
+            <a:tbl>
+              <a:tblPr rtl="1" firstRow="1" bandRow="1">
+                <a:tableStyleId>{5C22544A-7EE6-4342-B048-85BDC9FD1C3A}</a:tableStyleId>
+              </a:tblPr>
+              <a:tblGrid>
+                <a:gridCol w="3301174"/>
+                <a:gridCol w="3301174"/>
+                <a:gridCol w="3301174"/>
+              </a:tblGrid>
+              <a:tr h="568710">
+                <a:tc>
+                  <a:txBody>
+                    <a:bodyPr/>
+                    <a:lstStyle/>
+                    <a:p>
+                      <a:pPr algn="ctr" rtl="0"/>
+                      <a:r>
+                        <a:rPr lang="en-US" sz="1800" dirty="0" smtClean="0"/>
+                        <a:t>Used In</a:t>
+                      </a:r>
+                      <a:endParaRPr lang="he-IL" sz="1800" dirty="0"/>
+                    </a:p>
+                  </a:txBody>
+                  <a:tcPr anchor="ctr"/>
+                </a:tc>
+                <a:tc>
+                  <a:txBody>
+                    <a:bodyPr/>
+                    <a:lstStyle/>
+                    <a:p>
+                      <a:pPr algn="ctr" rtl="0"/>
+                      <a:r>
+                        <a:rPr lang="en-US" sz="1800" dirty="0" smtClean="0"/>
+                        <a:t>Implementation Language</a:t>
+                      </a:r>
+                      <a:endParaRPr lang="he-IL" sz="1800" dirty="0"/>
+                    </a:p>
+                  </a:txBody>
+                  <a:tcPr anchor="ctr"/>
+                </a:tc>
+                <a:tc>
+                  <a:txBody>
+                    <a:bodyPr/>
+                    <a:lstStyle/>
+                    <a:p>
+                      <a:pPr algn="ctr" rtl="0"/>
+                      <a:r>
+                        <a:rPr lang="en-US" sz="1800" dirty="0" smtClean="0"/>
+                        <a:t>Engine</a:t>
+                      </a:r>
+                      <a:endParaRPr lang="he-IL" sz="1800" dirty="0"/>
+                    </a:p>
+                  </a:txBody>
+                  <a:tcPr anchor="ctr"/>
+                </a:tc>
+              </a:tr>
+              <a:tr h="474521">
+                <a:tc>
+                  <a:txBody>
+                    <a:bodyPr/>
+                    <a:lstStyle/>
+                    <a:p>
+                      <a:pPr algn="ctr" rtl="0"/>
+                      <a:r>
+                        <a:rPr lang="en-US" dirty="0" smtClean="0"/>
+                        <a:t>Chrome</a:t>
+                      </a:r>
+                      <a:endParaRPr lang="he-IL" dirty="0"/>
+                    </a:p>
+                  </a:txBody>
+                  <a:tcPr/>
+                </a:tc>
+                <a:tc>
+                  <a:txBody>
+                    <a:bodyPr/>
+                    <a:lstStyle/>
+                    <a:p>
+                      <a:pPr algn="ctr" rtl="0"/>
+                      <a:r>
+                        <a:rPr lang="en-US" dirty="0" smtClean="0"/>
+                        <a:t>C++</a:t>
+                      </a:r>
+                      <a:endParaRPr lang="he-IL" dirty="0"/>
+                    </a:p>
+                  </a:txBody>
+                  <a:tcPr/>
+                </a:tc>
+                <a:tc>
+                  <a:txBody>
+                    <a:bodyPr/>
+                    <a:lstStyle/>
+                    <a:p>
+                      <a:pPr algn="ctr" rtl="0"/>
+                      <a:r>
+                        <a:rPr lang="en-US" dirty="0" smtClean="0"/>
+                        <a:t>V8 (Node.js)</a:t>
+                      </a:r>
+                      <a:endParaRPr lang="he-IL" dirty="0"/>
+                    </a:p>
+                  </a:txBody>
+                  <a:tcPr/>
+                </a:tc>
+              </a:tr>
+              <a:tr h="474521">
+                <a:tc>
+                  <a:txBody>
+                    <a:bodyPr/>
+                    <a:lstStyle/>
+                    <a:p>
+                      <a:pPr algn="ctr" rtl="0"/>
+                      <a:r>
+                        <a:rPr lang="en-US" dirty="0" smtClean="0"/>
+                        <a:t>Firefox</a:t>
+                      </a:r>
+                      <a:endParaRPr lang="he-IL" dirty="0"/>
+                    </a:p>
+                  </a:txBody>
+                  <a:tcPr/>
+                </a:tc>
+                <a:tc>
+                  <a:txBody>
+                    <a:bodyPr/>
+                    <a:lstStyle/>
+                    <a:p>
+                      <a:pPr algn="ctr" rtl="0"/>
+                      <a:r>
+                        <a:rPr lang="en-US" dirty="0" smtClean="0"/>
+                        <a:t>C++</a:t>
+                      </a:r>
+                      <a:endParaRPr lang="he-IL" dirty="0"/>
+                    </a:p>
+                  </a:txBody>
+                  <a:tcPr/>
+                </a:tc>
+                <a:tc>
+                  <a:txBody>
+                    <a:bodyPr/>
+                    <a:lstStyle/>
+                    <a:p>
+                      <a:pPr algn="ctr" rtl="0"/>
+                      <a:r>
+                        <a:rPr lang="en-US" dirty="0" err="1" smtClean="0"/>
+                        <a:t>Spidermonkey</a:t>
+                      </a:r>
+                      <a:endParaRPr lang="he-IL" dirty="0"/>
+                    </a:p>
+                  </a:txBody>
+                  <a:tcPr/>
+                </a:tc>
+              </a:tr>
+              <a:tr h="474521">
+                <a:tc rowSpan="2">
+                  <a:txBody>
+                    <a:bodyPr/>
+                    <a:lstStyle/>
+                    <a:p>
+                      <a:pPr algn="ctr" rtl="0"/>
+                      <a:r>
+                        <a:rPr lang="en-US" dirty="0" smtClean="0"/>
+                        <a:t>Self-contained</a:t>
+                      </a:r>
+                      <a:r>
+                        <a:rPr lang="en-US" baseline="0" dirty="0" smtClean="0"/>
+                        <a:t> Jar</a:t>
+                      </a:r>
+                      <a:endParaRPr lang="he-IL" dirty="0"/>
+                    </a:p>
+                  </a:txBody>
+                  <a:tcPr anchor="ctr"/>
+                </a:tc>
+                <a:tc>
+                  <a:txBody>
+                    <a:bodyPr/>
+                    <a:lstStyle/>
+                    <a:p>
+                      <a:pPr algn="ctr" rtl="0"/>
+                      <a:r>
+                        <a:rPr lang="en-US" dirty="0" smtClean="0"/>
+                        <a:t>Java</a:t>
+                      </a:r>
+                      <a:endParaRPr lang="he-IL" dirty="0"/>
+                    </a:p>
+                  </a:txBody>
+                  <a:tcPr/>
+                </a:tc>
+                <a:tc>
+                  <a:txBody>
+                    <a:bodyPr/>
+                    <a:lstStyle/>
+                    <a:p>
+                      <a:pPr algn="ctr" rtl="0"/>
+                      <a:r>
+                        <a:rPr lang="en-US" dirty="0" err="1" smtClean="0"/>
+                        <a:t>DynJs</a:t>
+                      </a:r>
+                      <a:endParaRPr lang="he-IL" dirty="0"/>
+                    </a:p>
+                  </a:txBody>
+                  <a:tcPr/>
+                </a:tc>
+              </a:tr>
+              <a:tr h="474521">
+                <a:tc vMerge="1">
+                  <a:txBody>
+                    <a:bodyPr/>
+                    <a:lstStyle/>
+                    <a:p>
+                      <a:pPr algn="ctr" rtl="0"/>
+                      <a:endParaRPr lang="he-IL" dirty="0"/>
+                    </a:p>
+                  </a:txBody>
+                  <a:tcPr/>
+                </a:tc>
+                <a:tc>
+                  <a:txBody>
+                    <a:bodyPr/>
+                    <a:lstStyle/>
+                    <a:p>
+                      <a:pPr algn="ctr" rtl="0"/>
+                      <a:r>
+                        <a:rPr lang="en-US" dirty="0" smtClean="0"/>
+                        <a:t>Java</a:t>
+                      </a:r>
+                      <a:endParaRPr lang="he-IL" dirty="0"/>
+                    </a:p>
+                  </a:txBody>
+                  <a:tcPr/>
+                </a:tc>
+                <a:tc>
+                  <a:txBody>
+                    <a:bodyPr/>
+                    <a:lstStyle/>
+                    <a:p>
+                      <a:pPr algn="ctr" rtl="0"/>
+                      <a:r>
+                        <a:rPr lang="en-US" dirty="0" smtClean="0"/>
+                        <a:t>Rhino</a:t>
+                      </a:r>
+                      <a:endParaRPr lang="he-IL" dirty="0"/>
+                    </a:p>
+                  </a:txBody>
+                  <a:tcPr/>
+                </a:tc>
+              </a:tr>
+              <a:tr h="474521">
+                <a:tc>
+                  <a:txBody>
+                    <a:bodyPr/>
+                    <a:lstStyle/>
+                    <a:p>
+                      <a:pPr algn="ctr" rtl="0"/>
+                      <a:r>
+                        <a:rPr lang="en-US" dirty="0" smtClean="0"/>
+                        <a:t>Included</a:t>
+                      </a:r>
+                      <a:r>
+                        <a:rPr lang="en-US" baseline="0" dirty="0" smtClean="0"/>
+                        <a:t> in Java 8</a:t>
+                      </a:r>
+                      <a:endParaRPr lang="he-IL" dirty="0"/>
+                    </a:p>
+                  </a:txBody>
+                  <a:tcPr/>
+                </a:tc>
+                <a:tc>
+                  <a:txBody>
+                    <a:bodyPr/>
+                    <a:lstStyle/>
+                    <a:p>
+                      <a:pPr algn="ctr" rtl="0"/>
+                      <a:r>
+                        <a:rPr lang="en-US" dirty="0" smtClean="0"/>
+                        <a:t>Java</a:t>
+                      </a:r>
+                      <a:endParaRPr lang="he-IL" dirty="0"/>
+                    </a:p>
+                  </a:txBody>
+                  <a:tcPr/>
+                </a:tc>
+                <a:tc>
+                  <a:txBody>
+                    <a:bodyPr/>
+                    <a:lstStyle/>
+                    <a:p>
+                      <a:pPr algn="ctr" rtl="0"/>
+                      <a:r>
+                        <a:rPr lang="en-US" dirty="0" err="1" smtClean="0"/>
+                        <a:t>Nashorn</a:t>
+                      </a:r>
+                      <a:endParaRPr lang="he-IL" dirty="0"/>
+                    </a:p>
+                  </a:txBody>
+                  <a:tcPr/>
+                </a:tc>
+              </a:tr>
+            </a:tbl>
+          </a:graphicData>
+        </a:graphic>
+      </p:graphicFrame>
+    </p:spTree>
+    <p:extLst>
+      <p:ext uri="{BB962C8B-B14F-4D97-AF65-F5344CB8AC3E}">
+        <p14:creationId xmlns:p14="http://schemas.microsoft.com/office/powerpoint/2010/main" val="735615641"/>
+      </p:ext>
+    </p:extLst>
+  </p:cSld>
+  <p:clrMapOvr>
+    <a:masterClrMapping/>
+  </p:clrMapOvr>
+  <p:timing>
+    <p:tnLst>
+      <p:par>
+        <p:cTn id="1" dur="indefinite" restart="never" nodeType="tmRoot"/>
+      </p:par>
+    </p:tnLst>
+  </p:timing>
+</p:sld>
+</file>
+
+<file path=ppt/slides/slide6.xml><?xml version="1.0" encoding="utf-8"?>
+<p:sld xmlns:a="http://schemas.openxmlformats.org/drawingml/2006/main" xmlns:r="http://schemas.openxmlformats.org/officeDocument/2006/relationships" xmlns:p="http://schemas.openxmlformats.org/presentationml/2006/main">
+  <p:cSld>
+    <p:spTree>
+      <p:nvGrpSpPr>
+        <p:cNvPr id="1" name=""/>
+        <p:cNvGrpSpPr/>
+        <p:nvPr/>
+      </p:nvGrpSpPr>
+      <p:grpSpPr>
+        <a:xfrm>
+          <a:off x="0" y="0"/>
+          <a:ext cx="0" cy="0"/>
+          <a:chOff x="0" y="0"/>
+          <a:chExt cx="0" cy="0"/>
+        </a:xfrm>
+      </p:grpSpPr>
+      <p:sp>
+        <p:nvSpPr>
+          <p:cNvPr id="2" name="כותרת 1"/>
+          <p:cNvSpPr>
+            <a:spLocks noGrp="1"/>
+          </p:cNvSpPr>
+          <p:nvPr>
+            <p:ph type="title"/>
+          </p:nvPr>
+        </p:nvSpPr>
+        <p:spPr/>
+        <p:txBody>
+          <a:bodyPr/>
+          <a:lstStyle/>
+          <a:p>
+            <a:r>
+              <a:rPr lang="en-US" sz="7200" dirty="0" smtClean="0"/>
+              <a:t>Next Challenges</a:t>
+            </a:r>
+            <a:endParaRPr lang="he-IL" sz="7200" dirty="0"/>
+          </a:p>
+        </p:txBody>
+      </p:sp>
+      <p:sp>
+        <p:nvSpPr>
+          <p:cNvPr id="3" name="מציין מיקום תוכן 2"/>
+          <p:cNvSpPr>
+            <a:spLocks noGrp="1"/>
+          </p:cNvSpPr>
+          <p:nvPr>
+            <p:ph idx="1"/>
+          </p:nvPr>
+        </p:nvSpPr>
+        <p:spPr/>
+        <p:txBody>
+          <a:bodyPr/>
+          <a:lstStyle/>
+          <a:p>
+            <a:pPr>
+              <a:buFont typeface="Wingdings" panose="05000000000000000000" pitchFamily="2" charset="2"/>
+              <a:buChar char="§"/>
+            </a:pPr>
+            <a:r>
+              <a:rPr lang="en-US" b="1" dirty="0" smtClean="0"/>
+              <a:t>Symbol </a:t>
+            </a:r>
+            <a:r>
+              <a:rPr lang="en-US" b="1" dirty="0"/>
+              <a:t>t</a:t>
+            </a:r>
+            <a:r>
+              <a:rPr lang="en-US" b="1" dirty="0" smtClean="0"/>
+              <a:t>able </a:t>
+            </a:r>
+            <a:r>
+              <a:rPr lang="en-US" b="1" dirty="0" smtClean="0"/>
+              <a:t>being </a:t>
+            </a:r>
+            <a:r>
+              <a:rPr lang="en-US" b="1" dirty="0" smtClean="0"/>
+              <a:t>built ‘on demand</a:t>
+            </a:r>
+            <a:r>
+              <a:rPr lang="en-US" b="1" dirty="0" smtClean="0"/>
+              <a:t>’ (no nesting scopes)</a:t>
+            </a:r>
+            <a:endParaRPr lang="en-US" b="1" dirty="0" smtClean="0"/>
+          </a:p>
+          <a:p>
+            <a:pPr marL="457200" lvl="1" indent="0">
+              <a:buNone/>
+            </a:pPr>
+            <a:r>
+              <a:rPr lang="en-US" dirty="0">
+                <a:solidFill>
+                  <a:schemeClr val="accent2">
+                    <a:lumMod val="60000"/>
+                    <a:lumOff val="40000"/>
+                  </a:schemeClr>
+                </a:solidFill>
+              </a:rPr>
+              <a:t> </a:t>
+            </a:r>
+            <a:r>
+              <a:rPr lang="en-US" dirty="0" smtClean="0">
+                <a:solidFill>
+                  <a:schemeClr val="accent2">
+                    <a:lumMod val="60000"/>
+                    <a:lumOff val="40000"/>
+                  </a:schemeClr>
+                </a:solidFill>
+              </a:rPr>
+              <a:t>    If(a</a:t>
+            </a:r>
+            <a:r>
+              <a:rPr lang="en-US" dirty="0">
+                <a:solidFill>
+                  <a:schemeClr val="accent2">
+                    <a:lumMod val="60000"/>
+                    <a:lumOff val="40000"/>
+                  </a:schemeClr>
+                </a:solidFill>
+              </a:rPr>
+              <a:t>) </a:t>
+            </a:r>
+            <a:r>
+              <a:rPr lang="en-US" dirty="0" err="1">
+                <a:solidFill>
+                  <a:schemeClr val="accent2">
+                    <a:lumMod val="60000"/>
+                    <a:lumOff val="40000"/>
+                  </a:schemeClr>
+                </a:solidFill>
+              </a:rPr>
+              <a:t>var</a:t>
+            </a:r>
+            <a:r>
+              <a:rPr lang="en-US" dirty="0">
+                <a:solidFill>
+                  <a:schemeClr val="accent2">
+                    <a:lumMod val="60000"/>
+                    <a:lumOff val="40000"/>
+                  </a:schemeClr>
+                </a:solidFill>
+              </a:rPr>
+              <a:t> x = 1;</a:t>
+            </a:r>
+          </a:p>
+          <a:p>
+            <a:pPr marL="457200" lvl="1" indent="0">
+              <a:buNone/>
+            </a:pPr>
+            <a:r>
+              <a:rPr lang="en-US" dirty="0">
+                <a:solidFill>
+                  <a:schemeClr val="accent2">
+                    <a:lumMod val="60000"/>
+                    <a:lumOff val="40000"/>
+                  </a:schemeClr>
+                </a:solidFill>
+              </a:rPr>
+              <a:t>     </a:t>
+            </a:r>
+            <a:r>
+              <a:rPr lang="en-US" dirty="0" err="1">
+                <a:solidFill>
+                  <a:schemeClr val="accent2">
+                    <a:lumMod val="60000"/>
+                    <a:lumOff val="40000"/>
+                  </a:schemeClr>
+                </a:solidFill>
+              </a:rPr>
+              <a:t>var</a:t>
+            </a:r>
+            <a:r>
+              <a:rPr lang="en-US" dirty="0">
+                <a:solidFill>
+                  <a:schemeClr val="accent2">
+                    <a:lumMod val="60000"/>
+                    <a:lumOff val="40000"/>
+                  </a:schemeClr>
+                </a:solidFill>
+              </a:rPr>
+              <a:t> y = x;</a:t>
+            </a:r>
+          </a:p>
+          <a:p>
+            <a:pPr marL="457200" lvl="1" indent="0">
+              <a:buNone/>
+            </a:pPr>
+            <a:r>
+              <a:rPr lang="en-US" dirty="0"/>
+              <a:t>     </a:t>
+            </a:r>
+            <a:r>
+              <a:rPr lang="en-US" dirty="0" smtClean="0"/>
+              <a:t>a </a:t>
+            </a:r>
+            <a:r>
+              <a:rPr lang="en-US" dirty="0"/>
+              <a:t>== true  </a:t>
+            </a:r>
+            <a:r>
+              <a:rPr lang="en-US" dirty="0">
+                <a:sym typeface="Wingdings" panose="05000000000000000000" pitchFamily="2" charset="2"/>
+              </a:rPr>
+              <a:t> ok</a:t>
+            </a:r>
+          </a:p>
+          <a:p>
+            <a:pPr marL="457200" lvl="1" indent="0">
+              <a:buNone/>
+            </a:pPr>
+            <a:r>
+              <a:rPr lang="en-US" dirty="0">
+                <a:sym typeface="Wingdings" panose="05000000000000000000" pitchFamily="2" charset="2"/>
+              </a:rPr>
+              <a:t>     </a:t>
+            </a:r>
+            <a:r>
+              <a:rPr lang="en-US" dirty="0" smtClean="0">
+                <a:sym typeface="Wingdings" panose="05000000000000000000" pitchFamily="2" charset="2"/>
+              </a:rPr>
+              <a:t>a </a:t>
+            </a:r>
+            <a:r>
+              <a:rPr lang="en-US" dirty="0">
+                <a:sym typeface="Wingdings" panose="05000000000000000000" pitchFamily="2" charset="2"/>
+              </a:rPr>
+              <a:t>== false  error: x is not </a:t>
+            </a:r>
+            <a:r>
+              <a:rPr lang="en-US" dirty="0" smtClean="0">
+                <a:sym typeface="Wingdings" panose="05000000000000000000" pitchFamily="2" charset="2"/>
+              </a:rPr>
+              <a:t>defined</a:t>
+            </a:r>
+            <a:endParaRPr lang="en-US" dirty="0" smtClean="0"/>
+          </a:p>
+          <a:p>
+            <a:pPr>
+              <a:buFont typeface="Wingdings" panose="05000000000000000000" pitchFamily="2" charset="2"/>
+              <a:buChar char="§"/>
+            </a:pPr>
+            <a:r>
+              <a:rPr lang="en-US" b="1" dirty="0" smtClean="0"/>
+              <a:t>Halt Problem</a:t>
+            </a:r>
+          </a:p>
+          <a:p>
+            <a:pPr marL="457200" lvl="1" indent="0">
+              <a:buNone/>
+            </a:pPr>
+            <a:r>
+              <a:rPr lang="en-US" b="1" dirty="0" smtClean="0">
+                <a:solidFill>
+                  <a:schemeClr val="accent2">
+                    <a:lumMod val="60000"/>
+                    <a:lumOff val="40000"/>
+                  </a:schemeClr>
+                </a:solidFill>
+              </a:rPr>
+              <a:t>    </a:t>
+            </a:r>
+            <a:r>
+              <a:rPr lang="en-US" dirty="0" smtClean="0">
+                <a:solidFill>
+                  <a:schemeClr val="accent2">
+                    <a:lumMod val="60000"/>
+                    <a:lumOff val="40000"/>
+                  </a:schemeClr>
+                </a:solidFill>
+              </a:rPr>
+              <a:t>function f()  { g(); }</a:t>
+            </a:r>
+          </a:p>
+          <a:p>
+            <a:pPr marL="457200" lvl="1" indent="0">
+              <a:buNone/>
+            </a:pPr>
+            <a:r>
+              <a:rPr lang="en-US" b="1" dirty="0">
+                <a:solidFill>
+                  <a:schemeClr val="accent2">
+                    <a:lumMod val="60000"/>
+                    <a:lumOff val="40000"/>
+                  </a:schemeClr>
+                </a:solidFill>
+              </a:rPr>
+              <a:t> </a:t>
+            </a:r>
+            <a:r>
+              <a:rPr lang="en-US" b="1" dirty="0" smtClean="0">
+                <a:solidFill>
+                  <a:schemeClr val="accent2">
+                    <a:lumMod val="60000"/>
+                    <a:lumOff val="40000"/>
+                  </a:schemeClr>
+                </a:solidFill>
+              </a:rPr>
+              <a:t>   </a:t>
+            </a:r>
+            <a:r>
+              <a:rPr lang="en-US" dirty="0" smtClean="0">
+                <a:solidFill>
+                  <a:schemeClr val="accent2">
+                    <a:lumMod val="60000"/>
+                    <a:lumOff val="40000"/>
+                  </a:schemeClr>
+                </a:solidFill>
+              </a:rPr>
+              <a:t>function g() { f();  }</a:t>
+            </a:r>
+          </a:p>
+          <a:p>
+            <a:pPr marL="457200" lvl="1" indent="0">
+              <a:buNone/>
+            </a:pPr>
+            <a:r>
+              <a:rPr lang="en-US" b="1" dirty="0" smtClean="0">
+                <a:solidFill>
+                  <a:schemeClr val="accent2">
+                    <a:lumMod val="60000"/>
+                    <a:lumOff val="40000"/>
+                  </a:schemeClr>
+                </a:solidFill>
+              </a:rPr>
+              <a:t>    </a:t>
+            </a:r>
+            <a:r>
+              <a:rPr lang="en-US" dirty="0" smtClean="0">
+                <a:solidFill>
+                  <a:schemeClr val="accent2">
+                    <a:lumMod val="60000"/>
+                    <a:lumOff val="40000"/>
+                  </a:schemeClr>
+                </a:solidFill>
+              </a:rPr>
+              <a:t>f();</a:t>
+            </a:r>
+            <a:endParaRPr lang="en-US" b="1" dirty="0" smtClean="0">
+              <a:solidFill>
+                <a:schemeClr val="accent2">
+                  <a:lumMod val="60000"/>
+                  <a:lumOff val="40000"/>
+                </a:schemeClr>
+              </a:solidFill>
+            </a:endParaRPr>
+          </a:p>
+          <a:p>
+            <a:pPr marL="457200" lvl="1" indent="0">
+              <a:buNone/>
+            </a:pPr>
+            <a:endParaRPr lang="en-US" dirty="0">
+              <a:sym typeface="Wingdings" panose="05000000000000000000" pitchFamily="2" charset="2"/>
+            </a:endParaRPr>
+          </a:p>
+        </p:txBody>
+      </p:sp>
+    </p:spTree>
+    <p:extLst>
+      <p:ext uri="{BB962C8B-B14F-4D97-AF65-F5344CB8AC3E}">
+        <p14:creationId xmlns:p14="http://schemas.microsoft.com/office/powerpoint/2010/main" val="984632440"/>
+      </p:ext>
+    </p:extLst>
+  </p:cSld>
+  <p:clrMapOvr>
+    <a:masterClrMapping/>
+  </p:clrMapOvr>
+</p:sld>
+</file>
+
 <file path=ppt/slides/slide7.xml><?xml version="1.0" encoding="utf-8"?>
 <p:sld xmlns:a="http://schemas.openxmlformats.org/drawingml/2006/main" xmlns:r="http://schemas.openxmlformats.org/officeDocument/2006/relationships" xmlns:p="http://schemas.openxmlformats.org/presentationml/2006/main">
   <p:cSld>
@@ -7986,272 +8352,85 @@
             </a:pPr>
             <a:r>
               <a:rPr lang="en-US" b="1" dirty="0" smtClean="0"/>
-              <a:t>Symbol </a:t>
-            </a:r>
-            <a:r>
-              <a:rPr lang="en-US" b="1" dirty="0"/>
-              <a:t>t</a:t>
-            </a:r>
-            <a:r>
-              <a:rPr lang="en-US" b="1" dirty="0" smtClean="0"/>
-              <a:t>able being built ‘on demand’</a:t>
-            </a:r>
-          </a:p>
-          <a:p>
-            <a:pPr marL="457200" lvl="1" indent="0">
-              <a:buNone/>
+              <a:t>Improve quality of the generated programs</a:t>
+            </a:r>
+          </a:p>
+          <a:p>
+            <a:pPr lvl="1">
+              <a:buFont typeface="Wingdings" panose="05000000000000000000" pitchFamily="2" charset="2"/>
+              <a:buChar char="§"/>
             </a:pPr>
             <a:r>
-              <a:rPr lang="en-US" dirty="0">
-                <a:solidFill>
-                  <a:schemeClr val="accent2">
-                    <a:lumMod val="60000"/>
-                    <a:lumOff val="40000"/>
-                  </a:schemeClr>
-                </a:solidFill>
-              </a:rPr>
-              <a:t> </a:t>
-            </a:r>
-            <a:r>
-              <a:rPr lang="en-US" dirty="0" smtClean="0">
-                <a:solidFill>
-                  <a:schemeClr val="accent2">
-                    <a:lumMod val="60000"/>
-                    <a:lumOff val="40000"/>
-                  </a:schemeClr>
-                </a:solidFill>
-              </a:rPr>
-              <a:t>    If(a</a:t>
-            </a:r>
-            <a:r>
-              <a:rPr lang="en-US" dirty="0">
-                <a:solidFill>
-                  <a:schemeClr val="accent2">
-                    <a:lumMod val="60000"/>
-                    <a:lumOff val="40000"/>
-                  </a:schemeClr>
-                </a:solidFill>
-              </a:rPr>
-              <a:t>) </a:t>
-            </a:r>
-            <a:r>
-              <a:rPr lang="en-US" dirty="0" err="1">
-                <a:solidFill>
-                  <a:schemeClr val="accent2">
-                    <a:lumMod val="60000"/>
-                    <a:lumOff val="40000"/>
-                  </a:schemeClr>
-                </a:solidFill>
-              </a:rPr>
-              <a:t>var</a:t>
-            </a:r>
-            <a:r>
-              <a:rPr lang="en-US" dirty="0">
-                <a:solidFill>
-                  <a:schemeClr val="accent2">
-                    <a:lumMod val="60000"/>
-                    <a:lumOff val="40000"/>
-                  </a:schemeClr>
-                </a:solidFill>
-              </a:rPr>
-              <a:t> x = 1;</a:t>
-            </a:r>
-          </a:p>
-          <a:p>
-            <a:pPr marL="457200" lvl="1" indent="0">
-              <a:buNone/>
+              <a:rPr lang="en-US" dirty="0" smtClean="0"/>
+              <a:t>Programs are very simplistic</a:t>
+            </a:r>
+          </a:p>
+          <a:p>
+            <a:pPr lvl="1">
+              <a:buFont typeface="Wingdings" panose="05000000000000000000" pitchFamily="2" charset="2"/>
+              <a:buChar char="§"/>
             </a:pPr>
             <a:r>
-              <a:rPr lang="en-US" dirty="0">
-                <a:solidFill>
-                  <a:schemeClr val="accent2">
-                    <a:lumMod val="60000"/>
-                    <a:lumOff val="40000"/>
-                  </a:schemeClr>
-                </a:solidFill>
-              </a:rPr>
-              <a:t>     </a:t>
-            </a:r>
-            <a:r>
-              <a:rPr lang="en-US" dirty="0" err="1">
-                <a:solidFill>
-                  <a:schemeClr val="accent2">
-                    <a:lumMod val="60000"/>
-                    <a:lumOff val="40000"/>
-                  </a:schemeClr>
-                </a:solidFill>
-              </a:rPr>
-              <a:t>var</a:t>
-            </a:r>
-            <a:r>
-              <a:rPr lang="en-US" dirty="0">
-                <a:solidFill>
-                  <a:schemeClr val="accent2">
-                    <a:lumMod val="60000"/>
-                    <a:lumOff val="40000"/>
-                  </a:schemeClr>
-                </a:solidFill>
-              </a:rPr>
-              <a:t> y = x;</a:t>
-            </a:r>
-          </a:p>
-          <a:p>
-            <a:pPr marL="457200" lvl="1" indent="0">
-              <a:buNone/>
-            </a:pPr>
-            <a:r>
-              <a:rPr lang="en-US" dirty="0"/>
-              <a:t>     x == true  </a:t>
-            </a:r>
-            <a:r>
-              <a:rPr lang="en-US" dirty="0">
-                <a:sym typeface="Wingdings" panose="05000000000000000000" pitchFamily="2" charset="2"/>
-              </a:rPr>
-              <a:t> ok</a:t>
-            </a:r>
-          </a:p>
-          <a:p>
-            <a:pPr marL="457200" lvl="1" indent="0">
-              <a:buNone/>
-            </a:pPr>
-            <a:r>
-              <a:rPr lang="en-US" dirty="0">
-                <a:sym typeface="Wingdings" panose="05000000000000000000" pitchFamily="2" charset="2"/>
-              </a:rPr>
-              <a:t>     x == false  error: x is not </a:t>
-            </a:r>
-            <a:r>
-              <a:rPr lang="en-US" dirty="0" smtClean="0">
-                <a:sym typeface="Wingdings" panose="05000000000000000000" pitchFamily="2" charset="2"/>
-              </a:rPr>
-              <a:t>defined</a:t>
-            </a:r>
-            <a:endParaRPr lang="en-US" dirty="0" smtClean="0"/>
+              <a:rPr lang="en-US" dirty="0" smtClean="0"/>
+              <a:t>Thus usually nothing is running when executing</a:t>
+            </a:r>
           </a:p>
           <a:p>
             <a:pPr>
               <a:buFont typeface="Wingdings" panose="05000000000000000000" pitchFamily="2" charset="2"/>
               <a:buChar char="§"/>
             </a:pPr>
+            <a:endParaRPr lang="en-US" b="1" dirty="0"/>
+          </a:p>
+          <a:p>
+            <a:pPr>
+              <a:buFont typeface="Wingdings" panose="05000000000000000000" pitchFamily="2" charset="2"/>
+              <a:buChar char="§"/>
+            </a:pPr>
             <a:r>
               <a:rPr lang="en-US" b="1" dirty="0" smtClean="0"/>
-              <a:t>Halt Problem</a:t>
-            </a:r>
-          </a:p>
-          <a:p>
-            <a:pPr marL="457200" lvl="1" indent="0">
-              <a:buNone/>
+              <a:t>How to summarize execution of a program?</a:t>
+            </a:r>
+          </a:p>
+          <a:p>
+            <a:pPr lvl="1">
+              <a:buFont typeface="Wingdings" panose="05000000000000000000" pitchFamily="2" charset="2"/>
+              <a:buChar char="§"/>
             </a:pPr>
             <a:r>
-              <a:rPr lang="en-US" b="1" dirty="0" smtClean="0">
-                <a:solidFill>
-                  <a:schemeClr val="accent2">
-                    <a:lumMod val="60000"/>
-                    <a:lumOff val="40000"/>
-                  </a:schemeClr>
-                </a:solidFill>
-              </a:rPr>
-              <a:t>    </a:t>
-            </a:r>
-            <a:r>
-              <a:rPr lang="en-US" dirty="0" smtClean="0">
-                <a:solidFill>
-                  <a:schemeClr val="accent2">
-                    <a:lumMod val="60000"/>
-                    <a:lumOff val="40000"/>
-                  </a:schemeClr>
-                </a:solidFill>
-              </a:rPr>
-              <a:t>function f()  { g(); }</a:t>
-            </a:r>
-          </a:p>
-          <a:p>
-            <a:pPr marL="457200" lvl="1" indent="0">
-              <a:buNone/>
+              <a:rPr lang="en-US" dirty="0" smtClean="0"/>
+              <a:t>Which variables are alive?</a:t>
+            </a:r>
+          </a:p>
+          <a:p>
+            <a:pPr lvl="1">
+              <a:buFont typeface="Wingdings" panose="05000000000000000000" pitchFamily="2" charset="2"/>
+              <a:buChar char="§"/>
             </a:pPr>
             <a:r>
-              <a:rPr lang="en-US" b="1" dirty="0">
-                <a:solidFill>
-                  <a:schemeClr val="accent2">
-                    <a:lumMod val="60000"/>
-                    <a:lumOff val="40000"/>
-                  </a:schemeClr>
-                </a:solidFill>
-              </a:rPr>
-              <a:t> </a:t>
-            </a:r>
-            <a:r>
-              <a:rPr lang="en-US" b="1" dirty="0" smtClean="0">
-                <a:solidFill>
-                  <a:schemeClr val="accent2">
-                    <a:lumMod val="60000"/>
-                    <a:lumOff val="40000"/>
-                  </a:schemeClr>
-                </a:solidFill>
-              </a:rPr>
-              <a:t>   </a:t>
-            </a:r>
-            <a:r>
-              <a:rPr lang="en-US" dirty="0" smtClean="0">
-                <a:solidFill>
-                  <a:schemeClr val="accent2">
-                    <a:lumMod val="60000"/>
-                    <a:lumOff val="40000"/>
-                  </a:schemeClr>
-                </a:solidFill>
-              </a:rPr>
-              <a:t>function g() { f();  }</a:t>
-            </a:r>
-          </a:p>
-          <a:p>
-            <a:pPr marL="457200" lvl="1" indent="0">
-              <a:buNone/>
-            </a:pPr>
-            <a:r>
-              <a:rPr lang="en-US" b="1" dirty="0" smtClean="0">
-                <a:solidFill>
-                  <a:schemeClr val="accent2">
-                    <a:lumMod val="60000"/>
-                    <a:lumOff val="40000"/>
-                  </a:schemeClr>
-                </a:solidFill>
-              </a:rPr>
-              <a:t>    </a:t>
-            </a:r>
-            <a:r>
-              <a:rPr lang="en-US" dirty="0" smtClean="0">
-                <a:solidFill>
-                  <a:schemeClr val="accent2">
-                    <a:lumMod val="60000"/>
-                    <a:lumOff val="40000"/>
-                  </a:schemeClr>
-                </a:solidFill>
-              </a:rPr>
-              <a:t>f();</a:t>
-            </a:r>
-            <a:endParaRPr lang="en-US" b="1" dirty="0" smtClean="0">
-              <a:solidFill>
-                <a:schemeClr val="accent2">
-                  <a:lumMod val="60000"/>
-                  <a:lumOff val="40000"/>
-                </a:schemeClr>
-              </a:solidFill>
-            </a:endParaRPr>
-          </a:p>
-          <a:p>
-            <a:pPr marL="457200" lvl="1" indent="0">
-              <a:buNone/>
-            </a:pPr>
-            <a:endParaRPr lang="en-US" dirty="0">
-              <a:sym typeface="Wingdings" panose="05000000000000000000" pitchFamily="2" charset="2"/>
-            </a:endParaRPr>
+              <a:rPr lang="en-US" dirty="0"/>
+              <a:t>p</a:t>
+            </a:r>
+            <a:r>
+              <a:rPr lang="en-US" dirty="0" smtClean="0"/>
+              <a:t>rint / </a:t>
+            </a:r>
+            <a:r>
+              <a:rPr lang="en-US" dirty="0" err="1" smtClean="0"/>
+              <a:t>xor</a:t>
+            </a:r>
+            <a:r>
+              <a:rPr lang="en-US" dirty="0" smtClean="0"/>
+              <a:t> / etc.</a:t>
+            </a:r>
+            <a:endParaRPr lang="en-US" dirty="0" smtClean="0"/>
           </a:p>
         </p:txBody>
       </p:sp>
     </p:spTree>
     <p:extLst>
       <p:ext uri="{BB962C8B-B14F-4D97-AF65-F5344CB8AC3E}">
-        <p14:creationId xmlns:p14="http://schemas.microsoft.com/office/powerpoint/2010/main" val="984632440"/>
+        <p14:creationId xmlns:p14="http://schemas.microsoft.com/office/powerpoint/2010/main" val="1133895227"/>
       </p:ext>
     </p:extLst>
   </p:cSld>

</xml_diff>